<commit_message>
Further notes for the working script
</commit_message>
<xml_diff>
--- a/SkillsMatter/Smart Nerd Dinner.pptx
+++ b/SkillsMatter/Smart Nerd Dinner.pptx
@@ -117,6 +117,11 @@
       </a:defRPr>
     </a:lvl9pPr>
   </p:defaultTextStyle>
+  <p:extLst>
+    <p:ext uri="{EFAFB233-063F-42B5-8137-9DF3F51BA10A}">
+      <p15:sldGuideLst xmlns:p15="http://schemas.microsoft.com/office/powerpoint/2012/main"/>
+    </p:ext>
+  </p:extLst>
 </p:presentation>
 </file>
 
@@ -311,7 +316,7 @@
           <a:p>
             <a:fld id="{42B73581-7191-4478-AEDF-6EE949711AFA}" type="datetimeFigureOut">
               <a:rPr lang="en-US" smtClean="0"/>
-              <a:t>11/23/2015</a:t>
+              <a:t>12/4/2015</a:t>
             </a:fld>
             <a:endParaRPr lang="en-US"/>
           </a:p>
@@ -747,7 +752,7 @@
           <a:p>
             <a:fld id="{42B73581-7191-4478-AEDF-6EE949711AFA}" type="datetimeFigureOut">
               <a:rPr lang="en-US" smtClean="0"/>
-              <a:t>11/23/2015</a:t>
+              <a:t>12/4/2015</a:t>
             </a:fld>
             <a:endParaRPr lang="en-US"/>
           </a:p>
@@ -997,7 +1002,7 @@
           <a:p>
             <a:fld id="{42B73581-7191-4478-AEDF-6EE949711AFA}" type="datetimeFigureOut">
               <a:rPr lang="en-US" smtClean="0"/>
-              <a:t>11/23/2015</a:t>
+              <a:t>12/4/2015</a:t>
             </a:fld>
             <a:endParaRPr lang="en-US"/>
           </a:p>
@@ -1305,7 +1310,7 @@
           <a:p>
             <a:fld id="{42B73581-7191-4478-AEDF-6EE949711AFA}" type="datetimeFigureOut">
               <a:rPr lang="en-US" smtClean="0"/>
-              <a:t>11/23/2015</a:t>
+              <a:t>12/4/2015</a:t>
             </a:fld>
             <a:endParaRPr lang="en-US"/>
           </a:p>
@@ -1623,7 +1628,7 @@
           <a:p>
             <a:fld id="{42B73581-7191-4478-AEDF-6EE949711AFA}" type="datetimeFigureOut">
               <a:rPr lang="en-US" smtClean="0"/>
-              <a:t>11/23/2015</a:t>
+              <a:t>12/4/2015</a:t>
             </a:fld>
             <a:endParaRPr lang="en-US"/>
           </a:p>
@@ -1925,7 +1930,7 @@
           <a:p>
             <a:fld id="{42B73581-7191-4478-AEDF-6EE949711AFA}" type="datetimeFigureOut">
               <a:rPr lang="en-US" smtClean="0"/>
-              <a:t>11/23/2015</a:t>
+              <a:t>12/4/2015</a:t>
             </a:fld>
             <a:endParaRPr lang="en-US"/>
           </a:p>
@@ -2292,7 +2297,7 @@
           <a:p>
             <a:fld id="{42B73581-7191-4478-AEDF-6EE949711AFA}" type="datetimeFigureOut">
               <a:rPr lang="en-US" smtClean="0"/>
-              <a:t>11/23/2015</a:t>
+              <a:t>12/4/2015</a:t>
             </a:fld>
             <a:endParaRPr lang="en-US"/>
           </a:p>
@@ -2466,7 +2471,7 @@
           <a:p>
             <a:fld id="{42B73581-7191-4478-AEDF-6EE949711AFA}" type="datetimeFigureOut">
               <a:rPr lang="en-US" smtClean="0"/>
-              <a:t>11/23/2015</a:t>
+              <a:t>12/4/2015</a:t>
             </a:fld>
             <a:endParaRPr lang="en-US"/>
           </a:p>
@@ -2646,7 +2651,7 @@
           <a:p>
             <a:fld id="{42B73581-7191-4478-AEDF-6EE949711AFA}" type="datetimeFigureOut">
               <a:rPr lang="en-US" smtClean="0"/>
-              <a:t>11/23/2015</a:t>
+              <a:t>12/4/2015</a:t>
             </a:fld>
             <a:endParaRPr lang="en-US"/>
           </a:p>
@@ -2816,7 +2821,7 @@
           <a:p>
             <a:fld id="{42B73581-7191-4478-AEDF-6EE949711AFA}" type="datetimeFigureOut">
               <a:rPr lang="en-US" smtClean="0"/>
-              <a:t>11/23/2015</a:t>
+              <a:t>12/4/2015</a:t>
             </a:fld>
             <a:endParaRPr lang="en-US"/>
           </a:p>
@@ -3066,7 +3071,7 @@
           <a:p>
             <a:fld id="{42B73581-7191-4478-AEDF-6EE949711AFA}" type="datetimeFigureOut">
               <a:rPr lang="en-US" smtClean="0"/>
-              <a:t>11/23/2015</a:t>
+              <a:t>12/4/2015</a:t>
             </a:fld>
             <a:endParaRPr lang="en-US"/>
           </a:p>
@@ -3302,7 +3307,7 @@
           <a:p>
             <a:fld id="{42B73581-7191-4478-AEDF-6EE949711AFA}" type="datetimeFigureOut">
               <a:rPr lang="en-US" smtClean="0"/>
-              <a:t>11/23/2015</a:t>
+              <a:t>12/4/2015</a:t>
             </a:fld>
             <a:endParaRPr lang="en-US"/>
           </a:p>
@@ -3684,7 +3689,7 @@
           <a:p>
             <a:fld id="{42B73581-7191-4478-AEDF-6EE949711AFA}" type="datetimeFigureOut">
               <a:rPr lang="en-US" smtClean="0"/>
-              <a:t>11/23/2015</a:t>
+              <a:t>12/4/2015</a:t>
             </a:fld>
             <a:endParaRPr lang="en-US"/>
           </a:p>
@@ -3802,7 +3807,7 @@
           <a:p>
             <a:fld id="{42B73581-7191-4478-AEDF-6EE949711AFA}" type="datetimeFigureOut">
               <a:rPr lang="en-US" smtClean="0"/>
-              <a:t>11/23/2015</a:t>
+              <a:t>12/4/2015</a:t>
             </a:fld>
             <a:endParaRPr lang="en-US"/>
           </a:p>
@@ -3897,7 +3902,7 @@
           <a:p>
             <a:fld id="{42B73581-7191-4478-AEDF-6EE949711AFA}" type="datetimeFigureOut">
               <a:rPr lang="en-US" smtClean="0"/>
-              <a:t>11/23/2015</a:t>
+              <a:t>12/4/2015</a:t>
             </a:fld>
             <a:endParaRPr lang="en-US"/>
           </a:p>
@@ -4152,7 +4157,7 @@
           <a:p>
             <a:fld id="{42B73581-7191-4478-AEDF-6EE949711AFA}" type="datetimeFigureOut">
               <a:rPr lang="en-US" smtClean="0"/>
-              <a:t>11/23/2015</a:t>
+              <a:t>12/4/2015</a:t>
             </a:fld>
             <a:endParaRPr lang="en-US"/>
           </a:p>
@@ -4435,7 +4440,7 @@
           <a:p>
             <a:fld id="{42B73581-7191-4478-AEDF-6EE949711AFA}" type="datetimeFigureOut">
               <a:rPr lang="en-US" smtClean="0"/>
-              <a:t>11/23/2015</a:t>
+              <a:t>12/4/2015</a:t>
             </a:fld>
             <a:endParaRPr lang="en-US"/>
           </a:p>
@@ -4841,7 +4846,7 @@
           <a:p>
             <a:fld id="{42B73581-7191-4478-AEDF-6EE949711AFA}" type="datetimeFigureOut">
               <a:rPr lang="en-US" smtClean="0"/>
-              <a:t>11/23/2015</a:t>
+              <a:t>12/4/2015</a:t>
             </a:fld>
             <a:endParaRPr lang="en-US"/>
           </a:p>
@@ -5455,6 +5460,13 @@
   <p:clrMapOvr>
     <a:masterClrMapping/>
   </p:clrMapOvr>
+  <p:timing>
+    <p:tnLst>
+      <p:par>
+        <p:cTn id="1" dur="indefinite" restart="never" nodeType="tmRoot"/>
+      </p:par>
+    </p:tnLst>
+  </p:timing>
 </p:sld>
 </file>
 
@@ -5539,6 +5551,13 @@
   <p:clrMapOvr>
     <a:masterClrMapping/>
   </p:clrMapOvr>
+  <p:timing>
+    <p:tnLst>
+      <p:par>
+        <p:cTn id="1" dur="indefinite" restart="never" nodeType="tmRoot"/>
+      </p:par>
+    </p:tnLst>
+  </p:timing>
 </p:sld>
 </file>
 
@@ -5611,6 +5630,13 @@
   <p:clrMapOvr>
     <a:masterClrMapping/>
   </p:clrMapOvr>
+  <p:timing>
+    <p:tnLst>
+      <p:par>
+        <p:cTn id="1" dur="indefinite" restart="never" nodeType="tmRoot"/>
+      </p:par>
+    </p:tnLst>
+  </p:timing>
 </p:sld>
 </file>
 
@@ -5687,6 +5713,13 @@
   <p:clrMapOvr>
     <a:masterClrMapping/>
   </p:clrMapOvr>
+  <p:timing>
+    <p:tnLst>
+      <p:par>
+        <p:cTn id="1" dur="indefinite" restart="never" nodeType="tmRoot"/>
+      </p:par>
+    </p:tnLst>
+  </p:timing>
 </p:sld>
 </file>
 
@@ -5759,6 +5792,13 @@
   <p:clrMapOvr>
     <a:masterClrMapping/>
   </p:clrMapOvr>
+  <p:timing>
+    <p:tnLst>
+      <p:par>
+        <p:cTn id="1" dur="indefinite" restart="never" nodeType="tmRoot"/>
+      </p:par>
+    </p:tnLst>
+  </p:timing>
 </p:sld>
 </file>
 
@@ -5826,6 +5866,13 @@
             <a:pPr lvl="1"/>
             <a:r>
               <a:rPr lang="en-US" dirty="0" smtClean="0"/>
+              <a:t>Java Script in the Browser</a:t>
+            </a:r>
+          </a:p>
+          <a:p>
+            <a:pPr lvl="1"/>
+            <a:r>
+              <a:rPr lang="en-US" dirty="0" smtClean="0"/>
               <a:t>C# for UI work and domain classes</a:t>
             </a:r>
           </a:p>
@@ -5876,6 +5923,13 @@
   <p:clrMapOvr>
     <a:masterClrMapping/>
   </p:clrMapOvr>
+  <p:timing>
+    <p:tnLst>
+      <p:par>
+        <p:cTn id="1" dur="indefinite" restart="never" nodeType="tmRoot"/>
+      </p:par>
+    </p:tnLst>
+  </p:timing>
 </p:sld>
 </file>
 
@@ -6006,6 +6060,13 @@
   <p:clrMapOvr>
     <a:masterClrMapping/>
   </p:clrMapOvr>
+  <p:timing>
+    <p:tnLst>
+      <p:par>
+        <p:cTn id="1" dur="indefinite" restart="never" nodeType="tmRoot"/>
+      </p:par>
+    </p:tnLst>
+  </p:timing>
 </p:sld>
 </file>
 
@@ -6102,6 +6163,13 @@
   <p:clrMapOvr>
     <a:masterClrMapping/>
   </p:clrMapOvr>
+  <p:timing>
+    <p:tnLst>
+      <p:par>
+        <p:cTn id="1" dur="indefinite" restart="never" nodeType="tmRoot"/>
+      </p:par>
+    </p:tnLst>
+  </p:timing>
 </p:sld>
 </file>
 
@@ -6301,6 +6369,81 @@
   <p:clrMapOvr>
     <a:masterClrMapping/>
   </p:clrMapOvr>
+  <p:timing>
+    <p:tnLst>
+      <p:par>
+        <p:cTn id="1" dur="indefinite" restart="never" nodeType="tmRoot">
+          <p:childTnLst>
+            <p:seq concurrent="1" nextAc="seek">
+              <p:cTn id="2" dur="indefinite" nodeType="mainSeq">
+                <p:childTnLst>
+                  <p:par>
+                    <p:cTn id="3" fill="hold">
+                      <p:stCondLst>
+                        <p:cond delay="indefinite"/>
+                      </p:stCondLst>
+                      <p:childTnLst>
+                        <p:par>
+                          <p:cTn id="4" fill="hold">
+                            <p:stCondLst>
+                              <p:cond delay="0"/>
+                            </p:stCondLst>
+                            <p:childTnLst>
+                              <p:par>
+                                <p:cTn id="5" presetID="1" presetClass="entr" presetSubtype="0" fill="hold" nodeType="clickEffect">
+                                  <p:stCondLst>
+                                    <p:cond delay="0"/>
+                                  </p:stCondLst>
+                                  <p:childTnLst>
+                                    <p:set>
+                                      <p:cBhvr>
+                                        <p:cTn id="6" dur="1" fill="hold">
+                                          <p:stCondLst>
+                                            <p:cond delay="0"/>
+                                          </p:stCondLst>
+                                        </p:cTn>
+                                        <p:tgtEl>
+                                          <p:spTgt spid="4"/>
+                                        </p:tgtEl>
+                                        <p:attrNameLst>
+                                          <p:attrName>style.visibility</p:attrName>
+                                        </p:attrNameLst>
+                                      </p:cBhvr>
+                                      <p:to>
+                                        <p:strVal val="visible"/>
+                                      </p:to>
+                                    </p:set>
+                                  </p:childTnLst>
+                                </p:cTn>
+                              </p:par>
+                            </p:childTnLst>
+                          </p:cTn>
+                        </p:par>
+                      </p:childTnLst>
+                    </p:cTn>
+                  </p:par>
+                </p:childTnLst>
+              </p:cTn>
+              <p:prevCondLst>
+                <p:cond evt="onPrev" delay="0">
+                  <p:tgtEl>
+                    <p:sldTgt/>
+                  </p:tgtEl>
+                </p:cond>
+              </p:prevCondLst>
+              <p:nextCondLst>
+                <p:cond evt="onNext" delay="0">
+                  <p:tgtEl>
+                    <p:sldTgt/>
+                  </p:tgtEl>
+                </p:cond>
+              </p:nextCondLst>
+            </p:seq>
+          </p:childTnLst>
+        </p:cTn>
+      </p:par>
+    </p:tnLst>
+  </p:timing>
 </p:sld>
 </file>
 
@@ -6357,7 +6500,7 @@
         <p:spPr/>
         <p:txBody>
           <a:bodyPr>
-            <a:normAutofit fontScale="92500" lnSpcReduction="20000"/>
+            <a:normAutofit/>
           </a:bodyPr>
           <a:lstStyle/>
           <a:p>
@@ -6383,7 +6526,7 @@
           <a:p>
             <a:r>
               <a:rPr lang="en-US" dirty="0" smtClean="0"/>
-              <a:t>Local Machine Learning</a:t>
+              <a:t>Azure Machine Learning</a:t>
             </a:r>
           </a:p>
           <a:p>
@@ -6398,26 +6541,6 @@
             <a:r>
               <a:rPr lang="en-US" dirty="0" smtClean="0"/>
               <a:t>You do</a:t>
-            </a:r>
-          </a:p>
-          <a:p>
-            <a:r>
-              <a:rPr lang="en-US" dirty="0" smtClean="0"/>
-              <a:t>Azure Machine Learning</a:t>
-            </a:r>
-          </a:p>
-          <a:p>
-            <a:pPr lvl="1"/>
-            <a:r>
-              <a:rPr lang="en-US" dirty="0" smtClean="0"/>
-              <a:t>I show</a:t>
-            </a:r>
-          </a:p>
-          <a:p>
-            <a:pPr lvl="1"/>
-            <a:r>
-              <a:rPr lang="en-US" dirty="0" smtClean="0"/>
-              <a:t>You do?</a:t>
             </a:r>
           </a:p>
           <a:p>
@@ -6439,6 +6562,13 @@
   <p:clrMapOvr>
     <a:masterClrMapping/>
   </p:clrMapOvr>
+  <p:timing>
+    <p:tnLst>
+      <p:par>
+        <p:cTn id="1" dur="indefinite" restart="never" nodeType="tmRoot"/>
+      </p:par>
+    </p:tnLst>
+  </p:timing>
 </p:sld>
 </file>
 
@@ -6948,6 +7078,13 @@
   <p:clrMapOvr>
     <a:masterClrMapping/>
   </p:clrMapOvr>
+  <p:timing>
+    <p:tnLst>
+      <p:par>
+        <p:cTn id="1" dur="indefinite" restart="never" nodeType="tmRoot"/>
+      </p:par>
+    </p:tnLst>
+  </p:timing>
 </p:sld>
 </file>
 
@@ -7014,7 +7151,7 @@
           <a:p>
             <a:r>
               <a:rPr lang="en-US" dirty="0" smtClean="0"/>
-              <a:t>We know some stuff via Google/Bing analytics</a:t>
+              <a:t>We know some stuff via Google/Bing analytics (Sign in or Inferred)</a:t>
             </a:r>
           </a:p>
           <a:p>
@@ -7042,6 +7179,13 @@
   <p:clrMapOvr>
     <a:masterClrMapping/>
   </p:clrMapOvr>
+  <p:timing>
+    <p:tnLst>
+      <p:par>
+        <p:cTn id="1" dur="indefinite" restart="never" nodeType="tmRoot"/>
+      </p:par>
+    </p:tnLst>
+  </p:timing>
 </p:sld>
 </file>
 
@@ -7100,7 +7244,26 @@
           <a:bodyPr/>
           <a:lstStyle/>
           <a:p>
-            <a:endParaRPr lang="en-US"/>
+            <a:r>
+              <a:rPr lang="en-US" dirty="0" smtClean="0"/>
+              <a:t>Install Visual Studio</a:t>
+            </a:r>
+            <a:r>
+              <a:rPr lang="en-US" dirty="0"/>
+              <a:t>: https://github.com/jamessdixon/NerdDinner</a:t>
+            </a:r>
+            <a:endParaRPr lang="en-US" dirty="0" smtClean="0"/>
+          </a:p>
+          <a:p>
+            <a:r>
+              <a:rPr lang="en-US" dirty="0" smtClean="0"/>
+              <a:t>https</a:t>
+            </a:r>
+            <a:r>
+              <a:rPr lang="en-US" dirty="0"/>
+              <a:t>://github.com/jamessdixon/NerdDinner</a:t>
+            </a:r>
+            <a:endParaRPr lang="en-US" dirty="0"/>
           </a:p>
         </p:txBody>
       </p:sp>
@@ -7114,6 +7277,13 @@
   <p:clrMapOvr>
     <a:masterClrMapping/>
   </p:clrMapOvr>
+  <p:timing>
+    <p:tnLst>
+      <p:par>
+        <p:cTn id="1" dur="indefinite" restart="never" nodeType="tmRoot"/>
+      </p:par>
+    </p:tnLst>
+  </p:timing>
 </p:sld>
 </file>
 

</xml_diff>

<commit_message>
added a cheat sheet
</commit_message>
<xml_diff>
--- a/SkillsMatter/Smart Nerd Dinner.pptx
+++ b/SkillsMatter/Smart Nerd Dinner.pptx
@@ -316,7 +316,7 @@
           <a:p>
             <a:fld id="{42B73581-7191-4478-AEDF-6EE949711AFA}" type="datetimeFigureOut">
               <a:rPr lang="en-US" smtClean="0"/>
-              <a:t>12/4/2015</a:t>
+              <a:t>12/5/2015</a:t>
             </a:fld>
             <a:endParaRPr lang="en-US"/>
           </a:p>
@@ -752,7 +752,7 @@
           <a:p>
             <a:fld id="{42B73581-7191-4478-AEDF-6EE949711AFA}" type="datetimeFigureOut">
               <a:rPr lang="en-US" smtClean="0"/>
-              <a:t>12/4/2015</a:t>
+              <a:t>12/5/2015</a:t>
             </a:fld>
             <a:endParaRPr lang="en-US"/>
           </a:p>
@@ -1002,7 +1002,7 @@
           <a:p>
             <a:fld id="{42B73581-7191-4478-AEDF-6EE949711AFA}" type="datetimeFigureOut">
               <a:rPr lang="en-US" smtClean="0"/>
-              <a:t>12/4/2015</a:t>
+              <a:t>12/5/2015</a:t>
             </a:fld>
             <a:endParaRPr lang="en-US"/>
           </a:p>
@@ -1310,7 +1310,7 @@
           <a:p>
             <a:fld id="{42B73581-7191-4478-AEDF-6EE949711AFA}" type="datetimeFigureOut">
               <a:rPr lang="en-US" smtClean="0"/>
-              <a:t>12/4/2015</a:t>
+              <a:t>12/5/2015</a:t>
             </a:fld>
             <a:endParaRPr lang="en-US"/>
           </a:p>
@@ -1628,7 +1628,7 @@
           <a:p>
             <a:fld id="{42B73581-7191-4478-AEDF-6EE949711AFA}" type="datetimeFigureOut">
               <a:rPr lang="en-US" smtClean="0"/>
-              <a:t>12/4/2015</a:t>
+              <a:t>12/5/2015</a:t>
             </a:fld>
             <a:endParaRPr lang="en-US"/>
           </a:p>
@@ -1930,7 +1930,7 @@
           <a:p>
             <a:fld id="{42B73581-7191-4478-AEDF-6EE949711AFA}" type="datetimeFigureOut">
               <a:rPr lang="en-US" smtClean="0"/>
-              <a:t>12/4/2015</a:t>
+              <a:t>12/5/2015</a:t>
             </a:fld>
             <a:endParaRPr lang="en-US"/>
           </a:p>
@@ -2297,7 +2297,7 @@
           <a:p>
             <a:fld id="{42B73581-7191-4478-AEDF-6EE949711AFA}" type="datetimeFigureOut">
               <a:rPr lang="en-US" smtClean="0"/>
-              <a:t>12/4/2015</a:t>
+              <a:t>12/5/2015</a:t>
             </a:fld>
             <a:endParaRPr lang="en-US"/>
           </a:p>
@@ -2471,7 +2471,7 @@
           <a:p>
             <a:fld id="{42B73581-7191-4478-AEDF-6EE949711AFA}" type="datetimeFigureOut">
               <a:rPr lang="en-US" smtClean="0"/>
-              <a:t>12/4/2015</a:t>
+              <a:t>12/5/2015</a:t>
             </a:fld>
             <a:endParaRPr lang="en-US"/>
           </a:p>
@@ -2651,7 +2651,7 @@
           <a:p>
             <a:fld id="{42B73581-7191-4478-AEDF-6EE949711AFA}" type="datetimeFigureOut">
               <a:rPr lang="en-US" smtClean="0"/>
-              <a:t>12/4/2015</a:t>
+              <a:t>12/5/2015</a:t>
             </a:fld>
             <a:endParaRPr lang="en-US"/>
           </a:p>
@@ -2821,7 +2821,7 @@
           <a:p>
             <a:fld id="{42B73581-7191-4478-AEDF-6EE949711AFA}" type="datetimeFigureOut">
               <a:rPr lang="en-US" smtClean="0"/>
-              <a:t>12/4/2015</a:t>
+              <a:t>12/5/2015</a:t>
             </a:fld>
             <a:endParaRPr lang="en-US"/>
           </a:p>
@@ -3071,7 +3071,7 @@
           <a:p>
             <a:fld id="{42B73581-7191-4478-AEDF-6EE949711AFA}" type="datetimeFigureOut">
               <a:rPr lang="en-US" smtClean="0"/>
-              <a:t>12/4/2015</a:t>
+              <a:t>12/5/2015</a:t>
             </a:fld>
             <a:endParaRPr lang="en-US"/>
           </a:p>
@@ -3307,7 +3307,7 @@
           <a:p>
             <a:fld id="{42B73581-7191-4478-AEDF-6EE949711AFA}" type="datetimeFigureOut">
               <a:rPr lang="en-US" smtClean="0"/>
-              <a:t>12/4/2015</a:t>
+              <a:t>12/5/2015</a:t>
             </a:fld>
             <a:endParaRPr lang="en-US"/>
           </a:p>
@@ -3689,7 +3689,7 @@
           <a:p>
             <a:fld id="{42B73581-7191-4478-AEDF-6EE949711AFA}" type="datetimeFigureOut">
               <a:rPr lang="en-US" smtClean="0"/>
-              <a:t>12/4/2015</a:t>
+              <a:t>12/5/2015</a:t>
             </a:fld>
             <a:endParaRPr lang="en-US"/>
           </a:p>
@@ -3807,7 +3807,7 @@
           <a:p>
             <a:fld id="{42B73581-7191-4478-AEDF-6EE949711AFA}" type="datetimeFigureOut">
               <a:rPr lang="en-US" smtClean="0"/>
-              <a:t>12/4/2015</a:t>
+              <a:t>12/5/2015</a:t>
             </a:fld>
             <a:endParaRPr lang="en-US"/>
           </a:p>
@@ -3902,7 +3902,7 @@
           <a:p>
             <a:fld id="{42B73581-7191-4478-AEDF-6EE949711AFA}" type="datetimeFigureOut">
               <a:rPr lang="en-US" smtClean="0"/>
-              <a:t>12/4/2015</a:t>
+              <a:t>12/5/2015</a:t>
             </a:fld>
             <a:endParaRPr lang="en-US"/>
           </a:p>
@@ -4157,7 +4157,7 @@
           <a:p>
             <a:fld id="{42B73581-7191-4478-AEDF-6EE949711AFA}" type="datetimeFigureOut">
               <a:rPr lang="en-US" smtClean="0"/>
-              <a:t>12/4/2015</a:t>
+              <a:t>12/5/2015</a:t>
             </a:fld>
             <a:endParaRPr lang="en-US"/>
           </a:p>
@@ -4440,7 +4440,7 @@
           <a:p>
             <a:fld id="{42B73581-7191-4478-AEDF-6EE949711AFA}" type="datetimeFigureOut">
               <a:rPr lang="en-US" smtClean="0"/>
-              <a:t>12/4/2015</a:t>
+              <a:t>12/5/2015</a:t>
             </a:fld>
             <a:endParaRPr lang="en-US"/>
           </a:p>
@@ -4846,7 +4846,7 @@
           <a:p>
             <a:fld id="{42B73581-7191-4478-AEDF-6EE949711AFA}" type="datetimeFigureOut">
               <a:rPr lang="en-US" smtClean="0"/>
-              <a:t>12/4/2015</a:t>
+              <a:t>12/5/2015</a:t>
             </a:fld>
             <a:endParaRPr lang="en-US"/>
           </a:p>
@@ -7263,7 +7263,6 @@
               <a:rPr lang="en-US" dirty="0"/>
               <a:t>://github.com/jamessdixon/NerdDinner</a:t>
             </a:r>
-            <a:endParaRPr lang="en-US" dirty="0"/>
           </a:p>
         </p:txBody>
       </p:sp>

</xml_diff>